<commit_message>
BB - updates and bug fixes
BB - updates and bug fixes
</commit_message>
<xml_diff>
--- a/resources/New Microsoft PowerPoint Presentation.pptx
+++ b/resources/New Microsoft PowerPoint Presentation.pptx
@@ -104,6 +104,11 @@
       </a:defRPr>
     </a:lvl9pPr>
   </p:defaultTextStyle>
+  <p:extLst>
+    <p:ext uri="{EFAFB233-063F-42B5-8137-9DF3F51BA10A}">
+      <p15:sldGuideLst xmlns:p15="http://schemas.microsoft.com/office/powerpoint/2012/main"/>
+    </p:ext>
+  </p:extLst>
 </p:presentation>
 </file>
 
@@ -256,7 +261,7 @@
           <a:p>
             <a:fld id="{6BF5E511-4721-4D58-9F6D-BF2310D65853}" type="datetimeFigureOut">
               <a:rPr lang="nl-NL" smtClean="0"/>
-              <a:t>19-2-2021</a:t>
+              <a:t>19-6-2022</a:t>
             </a:fld>
             <a:endParaRPr lang="nl-NL"/>
           </a:p>
@@ -456,7 +461,7 @@
           <a:p>
             <a:fld id="{6BF5E511-4721-4D58-9F6D-BF2310D65853}" type="datetimeFigureOut">
               <a:rPr lang="nl-NL" smtClean="0"/>
-              <a:t>19-2-2021</a:t>
+              <a:t>19-6-2022</a:t>
             </a:fld>
             <a:endParaRPr lang="nl-NL"/>
           </a:p>
@@ -666,7 +671,7 @@
           <a:p>
             <a:fld id="{6BF5E511-4721-4D58-9F6D-BF2310D65853}" type="datetimeFigureOut">
               <a:rPr lang="nl-NL" smtClean="0"/>
-              <a:t>19-2-2021</a:t>
+              <a:t>19-6-2022</a:t>
             </a:fld>
             <a:endParaRPr lang="nl-NL"/>
           </a:p>
@@ -866,7 +871,7 @@
           <a:p>
             <a:fld id="{6BF5E511-4721-4D58-9F6D-BF2310D65853}" type="datetimeFigureOut">
               <a:rPr lang="nl-NL" smtClean="0"/>
-              <a:t>19-2-2021</a:t>
+              <a:t>19-6-2022</a:t>
             </a:fld>
             <a:endParaRPr lang="nl-NL"/>
           </a:p>
@@ -1142,7 +1147,7 @@
           <a:p>
             <a:fld id="{6BF5E511-4721-4D58-9F6D-BF2310D65853}" type="datetimeFigureOut">
               <a:rPr lang="nl-NL" smtClean="0"/>
-              <a:t>19-2-2021</a:t>
+              <a:t>19-6-2022</a:t>
             </a:fld>
             <a:endParaRPr lang="nl-NL"/>
           </a:p>
@@ -1410,7 +1415,7 @@
           <a:p>
             <a:fld id="{6BF5E511-4721-4D58-9F6D-BF2310D65853}" type="datetimeFigureOut">
               <a:rPr lang="nl-NL" smtClean="0"/>
-              <a:t>19-2-2021</a:t>
+              <a:t>19-6-2022</a:t>
             </a:fld>
             <a:endParaRPr lang="nl-NL"/>
           </a:p>
@@ -1825,7 +1830,7 @@
           <a:p>
             <a:fld id="{6BF5E511-4721-4D58-9F6D-BF2310D65853}" type="datetimeFigureOut">
               <a:rPr lang="nl-NL" smtClean="0"/>
-              <a:t>19-2-2021</a:t>
+              <a:t>19-6-2022</a:t>
             </a:fld>
             <a:endParaRPr lang="nl-NL"/>
           </a:p>
@@ -1967,7 +1972,7 @@
           <a:p>
             <a:fld id="{6BF5E511-4721-4D58-9F6D-BF2310D65853}" type="datetimeFigureOut">
               <a:rPr lang="nl-NL" smtClean="0"/>
-              <a:t>19-2-2021</a:t>
+              <a:t>19-6-2022</a:t>
             </a:fld>
             <a:endParaRPr lang="nl-NL"/>
           </a:p>
@@ -2080,7 +2085,7 @@
           <a:p>
             <a:fld id="{6BF5E511-4721-4D58-9F6D-BF2310D65853}" type="datetimeFigureOut">
               <a:rPr lang="nl-NL" smtClean="0"/>
-              <a:t>19-2-2021</a:t>
+              <a:t>19-6-2022</a:t>
             </a:fld>
             <a:endParaRPr lang="nl-NL"/>
           </a:p>
@@ -2393,7 +2398,7 @@
           <a:p>
             <a:fld id="{6BF5E511-4721-4D58-9F6D-BF2310D65853}" type="datetimeFigureOut">
               <a:rPr lang="nl-NL" smtClean="0"/>
-              <a:t>19-2-2021</a:t>
+              <a:t>19-6-2022</a:t>
             </a:fld>
             <a:endParaRPr lang="nl-NL"/>
           </a:p>
@@ -2682,7 +2687,7 @@
           <a:p>
             <a:fld id="{6BF5E511-4721-4D58-9F6D-BF2310D65853}" type="datetimeFigureOut">
               <a:rPr lang="nl-NL" smtClean="0"/>
-              <a:t>19-2-2021</a:t>
+              <a:t>19-6-2022</a:t>
             </a:fld>
             <a:endParaRPr lang="nl-NL"/>
           </a:p>
@@ -2925,7 +2930,7 @@
           <a:p>
             <a:fld id="{6BF5E511-4721-4D58-9F6D-BF2310D65853}" type="datetimeFigureOut">
               <a:rPr lang="nl-NL" smtClean="0"/>
-              <a:t>19-2-2021</a:t>
+              <a:t>19-6-2022</a:t>
             </a:fld>
             <a:endParaRPr lang="nl-NL"/>
           </a:p>
@@ -3422,6 +3427,94 @@
           </a:fontRef>
         </p:style>
       </p:cxnSp>
+      <p:sp>
+        <p:nvSpPr>
+          <p:cNvPr id="2" name="TextBox 1">
+            <a:extLst>
+              <a:ext uri="{FF2B5EF4-FFF2-40B4-BE49-F238E27FC236}">
+                <a16:creationId xmlns:a16="http://schemas.microsoft.com/office/drawing/2014/main" id="{553C5D59-3A61-D056-C89D-64B6230C7B72}"/>
+              </a:ext>
+            </a:extLst>
+          </p:cNvPr>
+          <p:cNvSpPr txBox="1"/>
+          <p:nvPr/>
+        </p:nvSpPr>
+        <p:spPr>
+          <a:xfrm>
+            <a:off x="5557421" y="2175029"/>
+            <a:ext cx="300082" cy="369332"/>
+          </a:xfrm>
+          <a:prstGeom prst="rect">
+            <a:avLst/>
+          </a:prstGeom>
+          <a:noFill/>
+        </p:spPr>
+        <p:txBody>
+          <a:bodyPr wrap="none" rtlCol="0">
+            <a:spAutoFit/>
+          </a:bodyPr>
+          <a:lstStyle/>
+          <a:p>
+            <a:r>
+              <a:rPr lang="en-US" dirty="0">
+                <a:solidFill>
+                  <a:schemeClr val="accent6"/>
+                </a:solidFill>
+              </a:rPr>
+              <a:t>+</a:t>
+            </a:r>
+            <a:endParaRPr lang="nl-NL" dirty="0">
+              <a:solidFill>
+                <a:schemeClr val="accent6"/>
+              </a:solidFill>
+            </a:endParaRPr>
+          </a:p>
+        </p:txBody>
+      </p:sp>
+      <p:sp>
+        <p:nvSpPr>
+          <p:cNvPr id="7" name="TextBox 6">
+            <a:extLst>
+              <a:ext uri="{FF2B5EF4-FFF2-40B4-BE49-F238E27FC236}">
+                <a16:creationId xmlns:a16="http://schemas.microsoft.com/office/drawing/2014/main" id="{1A5CD284-006C-3E67-EBBC-F005083023BD}"/>
+              </a:ext>
+            </a:extLst>
+          </p:cNvPr>
+          <p:cNvSpPr txBox="1"/>
+          <p:nvPr/>
+        </p:nvSpPr>
+        <p:spPr>
+          <a:xfrm>
+            <a:off x="5767851" y="2175029"/>
+            <a:ext cx="255198" cy="369332"/>
+          </a:xfrm>
+          <a:prstGeom prst="rect">
+            <a:avLst/>
+          </a:prstGeom>
+          <a:noFill/>
+        </p:spPr>
+        <p:txBody>
+          <a:bodyPr wrap="none" rtlCol="0">
+            <a:spAutoFit/>
+          </a:bodyPr>
+          <a:lstStyle/>
+          <a:p>
+            <a:r>
+              <a:rPr lang="en-US" b="1" dirty="0">
+                <a:solidFill>
+                  <a:srgbClr val="FF0000"/>
+                </a:solidFill>
+              </a:rPr>
+              <a:t>-</a:t>
+            </a:r>
+            <a:endParaRPr lang="nl-NL" b="1" dirty="0">
+              <a:solidFill>
+                <a:srgbClr val="FF0000"/>
+              </a:solidFill>
+            </a:endParaRPr>
+          </a:p>
+        </p:txBody>
+      </p:sp>
     </p:spTree>
     <p:extLst>
       <p:ext uri="{BB962C8B-B14F-4D97-AF65-F5344CB8AC3E}">

</xml_diff>